<commit_message>
Made Rev.2 with the measurement IC changed to INA226.
</commit_message>
<xml_diff>
--- a/images/pinout.pptx
+++ b/images/pinout.pptx
@@ -5,12 +5,11 @@
     <p:sldMasterId id="2147483672" r:id="rId1"/>
   </p:sldMasterIdLst>
   <p:notesMasterIdLst>
-    <p:notesMasterId r:id="rId5"/>
+    <p:notesMasterId r:id="rId4"/>
   </p:notesMasterIdLst>
   <p:sldIdLst>
     <p:sldId id="257" r:id="rId2"/>
-    <p:sldId id="258" r:id="rId3"/>
-    <p:sldId id="259" r:id="rId4"/>
+    <p:sldId id="259" r:id="rId3"/>
   </p:sldIdLst>
   <p:sldSz cx="14400213" cy="10799763"/>
   <p:notesSz cx="6858000" cy="9144000"/>
@@ -1542,7 +1541,7 @@
           <a:p>
             <a:fld id="{76E19F18-D823-463A-8381-1811E19E96D2}" type="datetimeFigureOut">
               <a:rPr kumimoji="1" lang="ja-JP" altLang="en-US" smtClean="0"/>
-              <a:t>2023/4/29</a:t>
+              <a:t>2023/6/13</a:t>
             </a:fld>
             <a:endParaRPr kumimoji="1" lang="ja-JP" altLang="en-US"/>
           </a:p>
@@ -1972,7 +1971,7 @@
           <a:p>
             <a:fld id="{1FA9187C-4DE0-4CE3-96AB-364AA8EDF057}" type="datetimeFigureOut">
               <a:rPr kumimoji="1" lang="ja-JP" altLang="en-US" smtClean="0"/>
-              <a:t>2023/4/29</a:t>
+              <a:t>2023/6/13</a:t>
             </a:fld>
             <a:endParaRPr kumimoji="1" lang="ja-JP" altLang="en-US"/>
           </a:p>
@@ -2174,7 +2173,7 @@
           <a:p>
             <a:fld id="{1FA9187C-4DE0-4CE3-96AB-364AA8EDF057}" type="datetimeFigureOut">
               <a:rPr kumimoji="1" lang="ja-JP" altLang="en-US" smtClean="0"/>
-              <a:t>2023/4/29</a:t>
+              <a:t>2023/6/13</a:t>
             </a:fld>
             <a:endParaRPr kumimoji="1" lang="ja-JP" altLang="en-US"/>
           </a:p>
@@ -2386,7 +2385,7 @@
           <a:p>
             <a:fld id="{1FA9187C-4DE0-4CE3-96AB-364AA8EDF057}" type="datetimeFigureOut">
               <a:rPr kumimoji="1" lang="ja-JP" altLang="en-US" smtClean="0"/>
-              <a:t>2023/4/29</a:t>
+              <a:t>2023/6/13</a:t>
             </a:fld>
             <a:endParaRPr kumimoji="1" lang="ja-JP" altLang="en-US"/>
           </a:p>
@@ -2588,7 +2587,7 @@
           <a:p>
             <a:fld id="{1FA9187C-4DE0-4CE3-96AB-364AA8EDF057}" type="datetimeFigureOut">
               <a:rPr kumimoji="1" lang="ja-JP" altLang="en-US" smtClean="0"/>
-              <a:t>2023/4/29</a:t>
+              <a:t>2023/6/13</a:t>
             </a:fld>
             <a:endParaRPr kumimoji="1" lang="ja-JP" altLang="en-US"/>
           </a:p>
@@ -2832,7 +2831,7 @@
           <a:p>
             <a:fld id="{1FA9187C-4DE0-4CE3-96AB-364AA8EDF057}" type="datetimeFigureOut">
               <a:rPr kumimoji="1" lang="ja-JP" altLang="en-US" smtClean="0"/>
-              <a:t>2023/4/29</a:t>
+              <a:t>2023/6/13</a:t>
             </a:fld>
             <a:endParaRPr kumimoji="1" lang="ja-JP" altLang="en-US"/>
           </a:p>
@@ -3128,7 +3127,7 @@
           <a:p>
             <a:fld id="{1FA9187C-4DE0-4CE3-96AB-364AA8EDF057}" type="datetimeFigureOut">
               <a:rPr kumimoji="1" lang="ja-JP" altLang="en-US" smtClean="0"/>
-              <a:t>2023/4/29</a:t>
+              <a:t>2023/6/13</a:t>
             </a:fld>
             <a:endParaRPr kumimoji="1" lang="ja-JP" altLang="en-US"/>
           </a:p>
@@ -3559,7 +3558,7 @@
           <a:p>
             <a:fld id="{1FA9187C-4DE0-4CE3-96AB-364AA8EDF057}" type="datetimeFigureOut">
               <a:rPr kumimoji="1" lang="ja-JP" altLang="en-US" smtClean="0"/>
-              <a:t>2023/4/29</a:t>
+              <a:t>2023/6/13</a:t>
             </a:fld>
             <a:endParaRPr kumimoji="1" lang="ja-JP" altLang="en-US"/>
           </a:p>
@@ -3677,7 +3676,7 @@
           <a:p>
             <a:fld id="{1FA9187C-4DE0-4CE3-96AB-364AA8EDF057}" type="datetimeFigureOut">
               <a:rPr kumimoji="1" lang="ja-JP" altLang="en-US" smtClean="0"/>
-              <a:t>2023/4/29</a:t>
+              <a:t>2023/6/13</a:t>
             </a:fld>
             <a:endParaRPr kumimoji="1" lang="ja-JP" altLang="en-US"/>
           </a:p>
@@ -3772,7 +3771,7 @@
           <a:p>
             <a:fld id="{1FA9187C-4DE0-4CE3-96AB-364AA8EDF057}" type="datetimeFigureOut">
               <a:rPr kumimoji="1" lang="ja-JP" altLang="en-US" smtClean="0"/>
-              <a:t>2023/4/29</a:t>
+              <a:t>2023/6/13</a:t>
             </a:fld>
             <a:endParaRPr kumimoji="1" lang="ja-JP" altLang="en-US"/>
           </a:p>
@@ -4081,7 +4080,7 @@
           <a:p>
             <a:fld id="{1FA9187C-4DE0-4CE3-96AB-364AA8EDF057}" type="datetimeFigureOut">
               <a:rPr kumimoji="1" lang="ja-JP" altLang="en-US" smtClean="0"/>
-              <a:t>2023/4/29</a:t>
+              <a:t>2023/6/13</a:t>
             </a:fld>
             <a:endParaRPr kumimoji="1" lang="ja-JP" altLang="en-US"/>
           </a:p>
@@ -4338,7 +4337,7 @@
           <a:p>
             <a:fld id="{1FA9187C-4DE0-4CE3-96AB-364AA8EDF057}" type="datetimeFigureOut">
               <a:rPr kumimoji="1" lang="ja-JP" altLang="en-US" smtClean="0"/>
-              <a:t>2023/4/29</a:t>
+              <a:t>2023/6/13</a:t>
             </a:fld>
             <a:endParaRPr kumimoji="1" lang="ja-JP" altLang="en-US"/>
           </a:p>
@@ -4583,7 +4582,7 @@
           <a:p>
             <a:fld id="{1FA9187C-4DE0-4CE3-96AB-364AA8EDF057}" type="datetimeFigureOut">
               <a:rPr kumimoji="1" lang="ja-JP" altLang="en-US" smtClean="0"/>
-              <a:t>2023/4/29</a:t>
+              <a:t>2023/6/13</a:t>
             </a:fld>
             <a:endParaRPr kumimoji="1" lang="ja-JP" altLang="en-US"/>
           </a:p>
@@ -4990,50 +4989,32 @@
       </p:grpSpPr>
       <p:pic>
         <p:nvPicPr>
-          <p:cNvPr id="1028" name="Picture 4">
+          <p:cNvPr id="5" name="図 4" descr="電子機器, 回路 が含まれている画像&#10;&#10;自動的に生成された説明">
             <a:extLst>
               <a:ext uri="{FF2B5EF4-FFF2-40B4-BE49-F238E27FC236}">
-                <a16:creationId xmlns:a16="http://schemas.microsoft.com/office/drawing/2014/main" id="{0F5E2D94-BB6D-8AAA-044B-6A78DD11D74C}"/>
+                <a16:creationId xmlns:a16="http://schemas.microsoft.com/office/drawing/2014/main" id="{D3E61C9F-3877-5BC3-BBB4-97947887D713}"/>
               </a:ext>
             </a:extLst>
           </p:cNvPr>
           <p:cNvPicPr>
-            <a:picLocks noChangeAspect="1" noChangeArrowheads="1"/>
+            <a:picLocks noChangeAspect="1"/>
           </p:cNvPicPr>
           <p:nvPr/>
         </p:nvPicPr>
-        <p:blipFill rotWithShape="1">
-          <a:blip r:embed="rId2">
-            <a:extLst>
-              <a:ext uri="{28A0092B-C50C-407E-A947-70E740481C1C}">
-                <a14:useLocalDpi xmlns:a14="http://schemas.microsoft.com/office/drawing/2010/main" val="0"/>
-              </a:ext>
-            </a:extLst>
-          </a:blip>
-          <a:srcRect l="19864" t="22690" r="19864" b="20801"/>
-          <a:stretch/>
+        <p:blipFill>
+          <a:blip r:embed="rId2"/>
+          <a:stretch>
+            <a:fillRect/>
+          </a:stretch>
         </p:blipFill>
-        <p:spPr bwMode="auto">
+        <p:spPr>
           <a:xfrm>
-            <a:off x="2860428" y="2685079"/>
-            <a:ext cx="8679355" cy="5424594"/>
+            <a:off x="14748" y="511322"/>
+            <a:ext cx="14400213" cy="9600142"/>
           </a:xfrm>
           <a:prstGeom prst="rect">
             <a:avLst/>
           </a:prstGeom>
-          <a:noFill/>
-          <a:ln>
-            <a:noFill/>
-          </a:ln>
-          <a:extLst>
-            <a:ext uri="{909E8E84-426E-40DD-AFC4-6F175D3DCCD1}">
-              <a14:hiddenFill xmlns:a14="http://schemas.microsoft.com/office/drawing/2010/main">
-                <a:solidFill>
-                  <a:srgbClr val="FFFFFF"/>
-                </a:solidFill>
-              </a14:hiddenFill>
-            </a:ext>
-          </a:extLst>
         </p:spPr>
       </p:pic>
       <p:grpSp>
@@ -6674,84 +6655,6 @@
           <a:chExt cx="0" cy="0"/>
         </a:xfrm>
       </p:grpSpPr>
-      <p:pic>
-        <p:nvPicPr>
-          <p:cNvPr id="4" name="Picture 6">
-            <a:extLst>
-              <a:ext uri="{FF2B5EF4-FFF2-40B4-BE49-F238E27FC236}">
-                <a16:creationId xmlns:a16="http://schemas.microsoft.com/office/drawing/2014/main" id="{7CC03EA0-FFA0-EDB4-612E-E19693E51648}"/>
-              </a:ext>
-            </a:extLst>
-          </p:cNvPr>
-          <p:cNvPicPr>
-            <a:picLocks noChangeAspect="1" noChangeArrowheads="1"/>
-          </p:cNvPicPr>
-          <p:nvPr/>
-        </p:nvPicPr>
-        <p:blipFill rotWithShape="1">
-          <a:blip r:embed="rId2">
-            <a:extLst>
-              <a:ext uri="{28A0092B-C50C-407E-A947-70E740481C1C}">
-                <a14:useLocalDpi xmlns:a14="http://schemas.microsoft.com/office/drawing/2010/main" val="0"/>
-              </a:ext>
-            </a:extLst>
-          </a:blip>
-          <a:srcRect l="19864" t="22690" r="19864" b="20801"/>
-          <a:stretch/>
-        </p:blipFill>
-        <p:spPr bwMode="auto">
-          <a:xfrm>
-            <a:off x="2860430" y="2687583"/>
-            <a:ext cx="8679352" cy="5424595"/>
-          </a:xfrm>
-          <a:prstGeom prst="rect">
-            <a:avLst/>
-          </a:prstGeom>
-          <a:noFill/>
-          <a:ln>
-            <a:noFill/>
-          </a:ln>
-          <a:extLst>
-            <a:ext uri="{909E8E84-426E-40DD-AFC4-6F175D3DCCD1}">
-              <a14:hiddenFill xmlns:a14="http://schemas.microsoft.com/office/drawing/2010/main">
-                <a:solidFill>
-                  <a:srgbClr val="FFFFFF"/>
-                </a:solidFill>
-              </a14:hiddenFill>
-            </a:ext>
-          </a:extLst>
-        </p:spPr>
-      </p:pic>
-    </p:spTree>
-    <p:extLst>
-      <p:ext uri="{BB962C8B-B14F-4D97-AF65-F5344CB8AC3E}">
-        <p14:creationId xmlns:p14="http://schemas.microsoft.com/office/powerpoint/2010/main" val="1929352114"/>
-      </p:ext>
-    </p:extLst>
-  </p:cSld>
-  <p:clrMapOvr>
-    <a:masterClrMapping/>
-  </p:clrMapOvr>
-</p:sld>
-</file>
-
-<file path=ppt/slides/slide3.xml><?xml version="1.0" encoding="utf-8"?>
-<p:sld xmlns:a="http://schemas.openxmlformats.org/drawingml/2006/main" xmlns:r="http://schemas.openxmlformats.org/officeDocument/2006/relationships" xmlns:p="http://schemas.openxmlformats.org/presentationml/2006/main">
-  <p:cSld>
-    <p:spTree>
-      <p:nvGrpSpPr>
-        <p:cNvPr id="1" name=""/>
-        <p:cNvGrpSpPr/>
-        <p:nvPr/>
-      </p:nvGrpSpPr>
-      <p:grpSpPr>
-        <a:xfrm>
-          <a:off x="0" y="0"/>
-          <a:ext cx="0" cy="0"/>
-          <a:chOff x="0" y="0"/>
-          <a:chExt cx="0" cy="0"/>
-        </a:xfrm>
-      </p:grpSpPr>
       <p:grpSp>
         <p:nvGrpSpPr>
           <p:cNvPr id="52" name="グループ化 51">
@@ -6917,7 +6820,17 @@
                   <a:latin typeface="Times New Roman" panose="02020603050405020304" pitchFamily="18" charset="0"/>
                   <a:cs typeface="Times New Roman" panose="02020603050405020304" pitchFamily="18" charset="0"/>
                 </a:rPr>
-                <a:t>0 V to 28V</a:t>
+                <a:t>0 V </a:t>
+              </a:r>
+              <a:r>
+                <a:rPr kumimoji="1" lang="en-US" altLang="ja-JP" sz="2000">
+                  <a:solidFill>
+                    <a:schemeClr val="tx1"/>
+                  </a:solidFill>
+                  <a:latin typeface="Times New Roman" panose="02020603050405020304" pitchFamily="18" charset="0"/>
+                  <a:cs typeface="Times New Roman" panose="02020603050405020304" pitchFamily="18" charset="0"/>
+                </a:rPr>
+                <a:t>to 36V</a:t>
               </a:r>
               <a:endParaRPr kumimoji="1" lang="ja-JP" altLang="en-US" sz="3200" dirty="0">
                 <a:solidFill>

</xml_diff>

<commit_message>
Changed the color of the board preview to a shade closer to the actual color.
</commit_message>
<xml_diff>
--- a/images/pinout.pptx
+++ b/images/pinout.pptx
@@ -119,13 +119,45 @@
 <file path=ppt/revisionInfo.xml><?xml version="1.0" encoding="utf-8"?>
 <p1510:revInfo xmlns:a="http://schemas.openxmlformats.org/drawingml/2006/main" xmlns:r="http://schemas.openxmlformats.org/officeDocument/2006/relationships" xmlns:p1510="http://schemas.microsoft.com/office/powerpoint/2015/10/main">
   <p1510:revLst>
-    <p1510:client id="{44D760B1-647A-4A96-BE88-A80449FA6F1C}" v="72" dt="2023-04-28T17:43:08.312"/>
+    <p1510:client id="{B6DDC11F-83F4-46E6-9359-55A9E240DBF0}" v="1" dt="2023-06-14T11:52:23.231"/>
   </p1510:revLst>
 </p1510:revInfo>
 </file>
 
 <file path=ppt/changesInfos/changesInfo1.xml><?xml version="1.0" encoding="utf-8"?>
 <pc:chgInfo xmlns:a="http://schemas.openxmlformats.org/drawingml/2006/main" xmlns:r="http://schemas.openxmlformats.org/officeDocument/2006/relationships" xmlns:ac="http://schemas.microsoft.com/office/drawing/2013/main/command" xmlns:pc="http://schemas.microsoft.com/office/powerpoint/2013/main/command">
+  <pc:docChgLst>
+    <pc:chgData name="久保寺　真仁" userId="2768f32b-5882-4410-b2b1-7e7a9f4ff427" providerId="ADAL" clId="{B6DDC11F-83F4-46E6-9359-55A9E240DBF0}"/>
+    <pc:docChg chg="custSel modSld">
+      <pc:chgData name="久保寺　真仁" userId="2768f32b-5882-4410-b2b1-7e7a9f4ff427" providerId="ADAL" clId="{B6DDC11F-83F4-46E6-9359-55A9E240DBF0}" dt="2023-06-14T11:52:33.297" v="16" actId="167"/>
+      <pc:docMkLst>
+        <pc:docMk/>
+      </pc:docMkLst>
+      <pc:sldChg chg="addSp delSp modSp mod">
+        <pc:chgData name="久保寺　真仁" userId="2768f32b-5882-4410-b2b1-7e7a9f4ff427" providerId="ADAL" clId="{B6DDC11F-83F4-46E6-9359-55A9E240DBF0}" dt="2023-06-14T11:52:33.297" v="16" actId="167"/>
+        <pc:sldMkLst>
+          <pc:docMk/>
+          <pc:sldMk cId="3159971292" sldId="257"/>
+        </pc:sldMkLst>
+        <pc:picChg chg="add mod ord">
+          <ac:chgData name="久保寺　真仁" userId="2768f32b-5882-4410-b2b1-7e7a9f4ff427" providerId="ADAL" clId="{B6DDC11F-83F4-46E6-9359-55A9E240DBF0}" dt="2023-06-14T11:52:33.297" v="16" actId="167"/>
+          <ac:picMkLst>
+            <pc:docMk/>
+            <pc:sldMk cId="3159971292" sldId="257"/>
+            <ac:picMk id="3" creationId="{4D110BC1-293B-6E92-BCF7-4B20D2D1D46C}"/>
+          </ac:picMkLst>
+        </pc:picChg>
+        <pc:picChg chg="del">
+          <ac:chgData name="久保寺　真仁" userId="2768f32b-5882-4410-b2b1-7e7a9f4ff427" providerId="ADAL" clId="{B6DDC11F-83F4-46E6-9359-55A9E240DBF0}" dt="2023-06-14T11:52:22.915" v="0" actId="478"/>
+          <ac:picMkLst>
+            <pc:docMk/>
+            <pc:sldMk cId="3159971292" sldId="257"/>
+            <ac:picMk id="5" creationId="{D3E61C9F-3877-5BC3-BBB4-97947887D713}"/>
+          </ac:picMkLst>
+        </pc:picChg>
+      </pc:sldChg>
+    </pc:docChg>
+  </pc:docChgLst>
   <pc:docChgLst>
     <pc:chgData name="久保寺　真仁" userId="2768f32b-5882-4410-b2b1-7e7a9f4ff427" providerId="ADAL" clId="{44D760B1-647A-4A96-BE88-A80449FA6F1C}"/>
     <pc:docChg chg="undo redo custSel addSld delSld modSld">
@@ -1541,7 +1573,7 @@
           <a:p>
             <a:fld id="{76E19F18-D823-463A-8381-1811E19E96D2}" type="datetimeFigureOut">
               <a:rPr kumimoji="1" lang="ja-JP" altLang="en-US" smtClean="0"/>
-              <a:t>2023/6/13</a:t>
+              <a:t>2023/6/14</a:t>
             </a:fld>
             <a:endParaRPr kumimoji="1" lang="ja-JP" altLang="en-US"/>
           </a:p>
@@ -1971,7 +2003,7 @@
           <a:p>
             <a:fld id="{1FA9187C-4DE0-4CE3-96AB-364AA8EDF057}" type="datetimeFigureOut">
               <a:rPr kumimoji="1" lang="ja-JP" altLang="en-US" smtClean="0"/>
-              <a:t>2023/6/13</a:t>
+              <a:t>2023/6/14</a:t>
             </a:fld>
             <a:endParaRPr kumimoji="1" lang="ja-JP" altLang="en-US"/>
           </a:p>
@@ -2173,7 +2205,7 @@
           <a:p>
             <a:fld id="{1FA9187C-4DE0-4CE3-96AB-364AA8EDF057}" type="datetimeFigureOut">
               <a:rPr kumimoji="1" lang="ja-JP" altLang="en-US" smtClean="0"/>
-              <a:t>2023/6/13</a:t>
+              <a:t>2023/6/14</a:t>
             </a:fld>
             <a:endParaRPr kumimoji="1" lang="ja-JP" altLang="en-US"/>
           </a:p>
@@ -2385,7 +2417,7 @@
           <a:p>
             <a:fld id="{1FA9187C-4DE0-4CE3-96AB-364AA8EDF057}" type="datetimeFigureOut">
               <a:rPr kumimoji="1" lang="ja-JP" altLang="en-US" smtClean="0"/>
-              <a:t>2023/6/13</a:t>
+              <a:t>2023/6/14</a:t>
             </a:fld>
             <a:endParaRPr kumimoji="1" lang="ja-JP" altLang="en-US"/>
           </a:p>
@@ -2587,7 +2619,7 @@
           <a:p>
             <a:fld id="{1FA9187C-4DE0-4CE3-96AB-364AA8EDF057}" type="datetimeFigureOut">
               <a:rPr kumimoji="1" lang="ja-JP" altLang="en-US" smtClean="0"/>
-              <a:t>2023/6/13</a:t>
+              <a:t>2023/6/14</a:t>
             </a:fld>
             <a:endParaRPr kumimoji="1" lang="ja-JP" altLang="en-US"/>
           </a:p>
@@ -2831,7 +2863,7 @@
           <a:p>
             <a:fld id="{1FA9187C-4DE0-4CE3-96AB-364AA8EDF057}" type="datetimeFigureOut">
               <a:rPr kumimoji="1" lang="ja-JP" altLang="en-US" smtClean="0"/>
-              <a:t>2023/6/13</a:t>
+              <a:t>2023/6/14</a:t>
             </a:fld>
             <a:endParaRPr kumimoji="1" lang="ja-JP" altLang="en-US"/>
           </a:p>
@@ -3127,7 +3159,7 @@
           <a:p>
             <a:fld id="{1FA9187C-4DE0-4CE3-96AB-364AA8EDF057}" type="datetimeFigureOut">
               <a:rPr kumimoji="1" lang="ja-JP" altLang="en-US" smtClean="0"/>
-              <a:t>2023/6/13</a:t>
+              <a:t>2023/6/14</a:t>
             </a:fld>
             <a:endParaRPr kumimoji="1" lang="ja-JP" altLang="en-US"/>
           </a:p>
@@ -3558,7 +3590,7 @@
           <a:p>
             <a:fld id="{1FA9187C-4DE0-4CE3-96AB-364AA8EDF057}" type="datetimeFigureOut">
               <a:rPr kumimoji="1" lang="ja-JP" altLang="en-US" smtClean="0"/>
-              <a:t>2023/6/13</a:t>
+              <a:t>2023/6/14</a:t>
             </a:fld>
             <a:endParaRPr kumimoji="1" lang="ja-JP" altLang="en-US"/>
           </a:p>
@@ -3676,7 +3708,7 @@
           <a:p>
             <a:fld id="{1FA9187C-4DE0-4CE3-96AB-364AA8EDF057}" type="datetimeFigureOut">
               <a:rPr kumimoji="1" lang="ja-JP" altLang="en-US" smtClean="0"/>
-              <a:t>2023/6/13</a:t>
+              <a:t>2023/6/14</a:t>
             </a:fld>
             <a:endParaRPr kumimoji="1" lang="ja-JP" altLang="en-US"/>
           </a:p>
@@ -3771,7 +3803,7 @@
           <a:p>
             <a:fld id="{1FA9187C-4DE0-4CE3-96AB-364AA8EDF057}" type="datetimeFigureOut">
               <a:rPr kumimoji="1" lang="ja-JP" altLang="en-US" smtClean="0"/>
-              <a:t>2023/6/13</a:t>
+              <a:t>2023/6/14</a:t>
             </a:fld>
             <a:endParaRPr kumimoji="1" lang="ja-JP" altLang="en-US"/>
           </a:p>
@@ -4080,7 +4112,7 @@
           <a:p>
             <a:fld id="{1FA9187C-4DE0-4CE3-96AB-364AA8EDF057}" type="datetimeFigureOut">
               <a:rPr kumimoji="1" lang="ja-JP" altLang="en-US" smtClean="0"/>
-              <a:t>2023/6/13</a:t>
+              <a:t>2023/6/14</a:t>
             </a:fld>
             <a:endParaRPr kumimoji="1" lang="ja-JP" altLang="en-US"/>
           </a:p>
@@ -4337,7 +4369,7 @@
           <a:p>
             <a:fld id="{1FA9187C-4DE0-4CE3-96AB-364AA8EDF057}" type="datetimeFigureOut">
               <a:rPr kumimoji="1" lang="ja-JP" altLang="en-US" smtClean="0"/>
-              <a:t>2023/6/13</a:t>
+              <a:t>2023/6/14</a:t>
             </a:fld>
             <a:endParaRPr kumimoji="1" lang="ja-JP" altLang="en-US"/>
           </a:p>
@@ -4582,7 +4614,7 @@
           <a:p>
             <a:fld id="{1FA9187C-4DE0-4CE3-96AB-364AA8EDF057}" type="datetimeFigureOut">
               <a:rPr kumimoji="1" lang="ja-JP" altLang="en-US" smtClean="0"/>
-              <a:t>2023/6/13</a:t>
+              <a:t>2023/6/14</a:t>
             </a:fld>
             <a:endParaRPr kumimoji="1" lang="ja-JP" altLang="en-US"/>
           </a:p>
@@ -4989,10 +5021,10 @@
       </p:grpSpPr>
       <p:pic>
         <p:nvPicPr>
-          <p:cNvPr id="5" name="図 4" descr="電子機器, 回路 が含まれている画像&#10;&#10;自動的に生成された説明">
+          <p:cNvPr id="3" name="図 2" descr="電子機器の部品&#10;&#10;低い精度で自動的に生成された説明">
             <a:extLst>
               <a:ext uri="{FF2B5EF4-FFF2-40B4-BE49-F238E27FC236}">
-                <a16:creationId xmlns:a16="http://schemas.microsoft.com/office/drawing/2014/main" id="{D3E61C9F-3877-5BC3-BBB4-97947887D713}"/>
+                <a16:creationId xmlns:a16="http://schemas.microsoft.com/office/drawing/2014/main" id="{4D110BC1-293B-6E92-BCF7-4B20D2D1D46C}"/>
               </a:ext>
             </a:extLst>
           </p:cNvPr>
@@ -5009,7 +5041,7 @@
         </p:blipFill>
         <p:spPr>
           <a:xfrm>
-            <a:off x="14748" y="511322"/>
+            <a:off x="0" y="511322"/>
             <a:ext cx="14400213" cy="9600142"/>
           </a:xfrm>
           <a:prstGeom prst="rect">

</xml_diff>